<commit_message>
add adaptive wf draft
</commit_message>
<xml_diff>
--- a/meeting-notes/dynamic patient questionnaire-promis.pptx
+++ b/meeting-notes/dynamic patient questionnaire-promis.pptx
@@ -104,6 +104,11 @@
       </a:defRPr>
     </a:lvl9pPr>
   </p:defaultTextStyle>
+  <p:extLst>
+    <p:ext uri="{EFAFB233-063F-42B5-8137-9DF3F51BA10A}">
+      <p15:sldGuideLst xmlns:p15="http://schemas.microsoft.com/office/powerpoint/2012/main"/>
+    </p:ext>
+  </p:extLst>
 </p:presentation>
 </file>
 
@@ -238,7 +243,7 @@
           <a:p>
             <a:fld id="{65814268-021D-CC4E-ACF0-06602CC478A3}" type="datetimeFigureOut">
               <a:rPr lang="en-US" smtClean="0"/>
-              <a:t>6/22/18</a:t>
+              <a:t>7/31/18</a:t>
             </a:fld>
             <a:endParaRPr lang="en-US"/>
           </a:p>
@@ -408,7 +413,7 @@
           <a:p>
             <a:fld id="{65814268-021D-CC4E-ACF0-06602CC478A3}" type="datetimeFigureOut">
               <a:rPr lang="en-US" smtClean="0"/>
-              <a:t>6/22/18</a:t>
+              <a:t>7/31/18</a:t>
             </a:fld>
             <a:endParaRPr lang="en-US"/>
           </a:p>
@@ -588,7 +593,7 @@
           <a:p>
             <a:fld id="{65814268-021D-CC4E-ACF0-06602CC478A3}" type="datetimeFigureOut">
               <a:rPr lang="en-US" smtClean="0"/>
-              <a:t>6/22/18</a:t>
+              <a:t>7/31/18</a:t>
             </a:fld>
             <a:endParaRPr lang="en-US"/>
           </a:p>
@@ -758,7 +763,7 @@
           <a:p>
             <a:fld id="{65814268-021D-CC4E-ACF0-06602CC478A3}" type="datetimeFigureOut">
               <a:rPr lang="en-US" smtClean="0"/>
-              <a:t>6/22/18</a:t>
+              <a:t>7/31/18</a:t>
             </a:fld>
             <a:endParaRPr lang="en-US"/>
           </a:p>
@@ -1004,7 +1009,7 @@
           <a:p>
             <a:fld id="{65814268-021D-CC4E-ACF0-06602CC478A3}" type="datetimeFigureOut">
               <a:rPr lang="en-US" smtClean="0"/>
-              <a:t>6/22/18</a:t>
+              <a:t>7/31/18</a:t>
             </a:fld>
             <a:endParaRPr lang="en-US"/>
           </a:p>
@@ -1236,7 +1241,7 @@
           <a:p>
             <a:fld id="{65814268-021D-CC4E-ACF0-06602CC478A3}" type="datetimeFigureOut">
               <a:rPr lang="en-US" smtClean="0"/>
-              <a:t>6/22/18</a:t>
+              <a:t>7/31/18</a:t>
             </a:fld>
             <a:endParaRPr lang="en-US"/>
           </a:p>
@@ -1603,7 +1608,7 @@
           <a:p>
             <a:fld id="{65814268-021D-CC4E-ACF0-06602CC478A3}" type="datetimeFigureOut">
               <a:rPr lang="en-US" smtClean="0"/>
-              <a:t>6/22/18</a:t>
+              <a:t>7/31/18</a:t>
             </a:fld>
             <a:endParaRPr lang="en-US"/>
           </a:p>
@@ -1721,7 +1726,7 @@
           <a:p>
             <a:fld id="{65814268-021D-CC4E-ACF0-06602CC478A3}" type="datetimeFigureOut">
               <a:rPr lang="en-US" smtClean="0"/>
-              <a:t>6/22/18</a:t>
+              <a:t>7/31/18</a:t>
             </a:fld>
             <a:endParaRPr lang="en-US"/>
           </a:p>
@@ -1816,7 +1821,7 @@
           <a:p>
             <a:fld id="{65814268-021D-CC4E-ACF0-06602CC478A3}" type="datetimeFigureOut">
               <a:rPr lang="en-US" smtClean="0"/>
-              <a:t>6/22/18</a:t>
+              <a:t>7/31/18</a:t>
             </a:fld>
             <a:endParaRPr lang="en-US"/>
           </a:p>
@@ -2093,7 +2098,7 @@
           <a:p>
             <a:fld id="{65814268-021D-CC4E-ACF0-06602CC478A3}" type="datetimeFigureOut">
               <a:rPr lang="en-US" smtClean="0"/>
-              <a:t>6/22/18</a:t>
+              <a:t>7/31/18</a:t>
             </a:fld>
             <a:endParaRPr lang="en-US"/>
           </a:p>
@@ -2346,7 +2351,7 @@
           <a:p>
             <a:fld id="{65814268-021D-CC4E-ACF0-06602CC478A3}" type="datetimeFigureOut">
               <a:rPr lang="en-US" smtClean="0"/>
-              <a:t>6/22/18</a:t>
+              <a:t>7/31/18</a:t>
             </a:fld>
             <a:endParaRPr lang="en-US"/>
           </a:p>
@@ -2559,7 +2564,7 @@
           <a:p>
             <a:fld id="{65814268-021D-CC4E-ACF0-06602CC478A3}" type="datetimeFigureOut">
               <a:rPr lang="en-US" smtClean="0"/>
-              <a:t>6/22/18</a:t>
+              <a:t>7/31/18</a:t>
             </a:fld>
             <a:endParaRPr lang="en-US"/>
           </a:p>
@@ -2972,8 +2977,8 @@
         </p:nvSpPr>
         <p:spPr>
           <a:xfrm>
-            <a:off x="7054030" y="662538"/>
-            <a:ext cx="4646713" cy="3630613"/>
+            <a:off x="6202111" y="697500"/>
+            <a:ext cx="2830429" cy="4185767"/>
           </a:xfrm>
           <a:prstGeom prst="roundRect">
             <a:avLst/>
@@ -3019,7 +3024,7 @@
         <p:spPr>
           <a:xfrm>
             <a:off x="863607" y="697500"/>
-            <a:ext cx="2904565" cy="3630613"/>
+            <a:ext cx="2904565" cy="4049312"/>
           </a:xfrm>
           <a:prstGeom prst="roundRect">
             <a:avLst/>
@@ -3293,10 +3298,10 @@
           <a:p>
             <a:pPr algn="ctr"/>
             <a:r>
-              <a:rPr lang="en-US" dirty="0" smtClean="0"/>
-              <a:t>Questions</a:t>
-            </a:r>
-            <a:endParaRPr lang="en-US" dirty="0"/>
+              <a:rPr lang="en-US" sz="1400" dirty="0" smtClean="0"/>
+              <a:t>Questionnaires with single question Items</a:t>
+            </a:r>
+            <a:endParaRPr lang="en-US" sz="1400" dirty="0"/>
           </a:p>
         </p:txBody>
       </p:sp>
@@ -3308,8 +3313,8 @@
         </p:nvSpPr>
         <p:spPr>
           <a:xfrm>
-            <a:off x="1118997" y="3297156"/>
-            <a:ext cx="1683572" cy="923330"/>
+            <a:off x="1009720" y="2981311"/>
+            <a:ext cx="2569286" cy="1477328"/>
           </a:xfrm>
           <a:prstGeom prst="rect">
             <a:avLst/>
@@ -3322,9 +3327,43 @@
           </a:bodyPr>
           <a:lstStyle/>
           <a:p>
-            <a:r>
-              <a:rPr lang="en-US" dirty="0" smtClean="0"/>
-              <a:t>Questionnaires with single question item</a:t>
+            <a:pPr marL="342900" indent="-342900">
+              <a:buFont typeface="+mj-lt"/>
+              <a:buAutoNum type="arabicPeriod"/>
+            </a:pPr>
+            <a:r>
+              <a:rPr lang="en-US" dirty="0"/>
+              <a:t>Store questions</a:t>
+            </a:r>
+          </a:p>
+          <a:p>
+            <a:pPr marL="342900" indent="-342900">
+              <a:buFont typeface="+mj-lt"/>
+              <a:buAutoNum type="arabicPeriod"/>
+            </a:pPr>
+            <a:r>
+              <a:rPr lang="en-US" dirty="0"/>
+              <a:t>Calculate scores</a:t>
+            </a:r>
+          </a:p>
+          <a:p>
+            <a:pPr marL="342900" indent="-342900">
+              <a:buFont typeface="+mj-lt"/>
+              <a:buAutoNum type="arabicPeriod"/>
+            </a:pPr>
+            <a:r>
+              <a:rPr lang="en-US" dirty="0"/>
+              <a:t>Send next question</a:t>
+            </a:r>
+          </a:p>
+          <a:p>
+            <a:pPr marL="342900" indent="-342900">
+              <a:buFont typeface="+mj-lt"/>
+              <a:buAutoNum type="arabicPeriod"/>
+            </a:pPr>
+            <a:r>
+              <a:rPr lang="en-US" dirty="0"/>
+              <a:t>Determines when done</a:t>
             </a:r>
             <a:endParaRPr lang="en-US" dirty="0"/>
           </a:p>
@@ -3338,8 +3377,8 @@
         </p:nvSpPr>
         <p:spPr>
           <a:xfrm rot="16200000">
-            <a:off x="5211330" y="-1887422"/>
-            <a:ext cx="731520" cy="5748056"/>
+            <a:off x="4381519" y="-1971390"/>
+            <a:ext cx="784299" cy="5325110"/>
           </a:xfrm>
           <a:prstGeom prst="curvedLeftArrow">
             <a:avLst/>
@@ -3376,16 +3415,47 @@
       </p:sp>
       <p:sp>
         <p:nvSpPr>
-          <p:cNvPr id="13" name="Rounded Rectangle 12"/>
+          <p:cNvPr id="15" name="TextBox 14"/>
+          <p:cNvSpPr txBox="1"/>
+          <p:nvPr/>
+        </p:nvSpPr>
+        <p:spPr>
+          <a:xfrm>
+            <a:off x="3928292" y="400050"/>
+            <a:ext cx="2000922" cy="923330"/>
+          </a:xfrm>
+          <a:prstGeom prst="rect">
+            <a:avLst/>
+          </a:prstGeom>
+          <a:noFill/>
+        </p:spPr>
+        <p:txBody>
+          <a:bodyPr wrap="square" rtlCol="0">
+            <a:spAutoFit/>
+          </a:bodyPr>
+          <a:lstStyle/>
+          <a:p>
+            <a:pPr algn="ctr"/>
+            <a:r>
+              <a:rPr lang="en-US" dirty="0" smtClean="0"/>
+              <a:t>Return Score and next Question as Questionnaire </a:t>
+            </a:r>
+            <a:endParaRPr lang="en-US" dirty="0"/>
+          </a:p>
+        </p:txBody>
+      </p:sp>
+      <p:sp>
+        <p:nvSpPr>
+          <p:cNvPr id="18" name="Curved Left Arrow 17"/>
           <p:cNvSpPr/>
           <p:nvPr/>
         </p:nvSpPr>
         <p:spPr>
-          <a:xfrm>
-            <a:off x="7106411" y="2020645"/>
-            <a:ext cx="2452743" cy="762000"/>
-          </a:xfrm>
-          <a:prstGeom prst="roundRect">
+          <a:xfrm rot="5400000">
+            <a:off x="4396820" y="2183155"/>
+            <a:ext cx="848056" cy="5231062"/>
+          </a:xfrm>
+          <a:prstGeom prst="curvedLeftArrow">
             <a:avLst/>
           </a:prstGeom>
         </p:spPr>
@@ -3410,86 +3480,26 @@
           <a:lstStyle/>
           <a:p>
             <a:pPr algn="ctr"/>
-            <a:r>
-              <a:rPr lang="en-US" dirty="0" err="1" smtClean="0"/>
-              <a:t>QuestionaireResponse</a:t>
-            </a:r>
-            <a:endParaRPr lang="en-US" dirty="0"/>
-          </a:p>
-        </p:txBody>
-      </p:sp>
-      <p:sp>
-        <p:nvSpPr>
-          <p:cNvPr id="14" name="TextBox 13"/>
-          <p:cNvSpPr txBox="1"/>
-          <p:nvPr/>
-        </p:nvSpPr>
-        <p:spPr>
-          <a:xfrm>
-            <a:off x="7247291" y="2825756"/>
-            <a:ext cx="2302287" cy="369332"/>
-          </a:xfrm>
-          <a:prstGeom prst="rect">
-            <a:avLst/>
-          </a:prstGeom>
-          <a:noFill/>
-        </p:spPr>
-        <p:txBody>
-          <a:bodyPr wrap="square" rtlCol="0">
-            <a:spAutoFit/>
-          </a:bodyPr>
-          <a:lstStyle/>
-          <a:p>
-            <a:r>
-              <a:rPr lang="en-US" dirty="0" smtClean="0"/>
-              <a:t> Answer a Question </a:t>
-            </a:r>
-            <a:endParaRPr lang="en-US" dirty="0"/>
-          </a:p>
-        </p:txBody>
-      </p:sp>
-      <p:sp>
-        <p:nvSpPr>
-          <p:cNvPr id="15" name="TextBox 14"/>
-          <p:cNvSpPr txBox="1"/>
-          <p:nvPr/>
-        </p:nvSpPr>
-        <p:spPr>
-          <a:xfrm>
-            <a:off x="4654883" y="867152"/>
-            <a:ext cx="2000922" cy="646331"/>
-          </a:xfrm>
-          <a:prstGeom prst="rect">
-            <a:avLst/>
-          </a:prstGeom>
-          <a:noFill/>
-        </p:spPr>
-        <p:txBody>
-          <a:bodyPr wrap="square" rtlCol="0">
-            <a:spAutoFit/>
-          </a:bodyPr>
-          <a:lstStyle/>
-          <a:p>
-            <a:r>
-              <a:rPr lang="en-US" dirty="0" smtClean="0"/>
-              <a:t>Display a  Question via CDS Hook Card</a:t>
-            </a:r>
-            <a:endParaRPr lang="en-US" dirty="0"/>
-          </a:p>
-        </p:txBody>
-      </p:sp>
-      <p:sp>
-        <p:nvSpPr>
-          <p:cNvPr id="18" name="Curved Left Arrow 17"/>
+            <a:endParaRPr lang="en-US">
+              <a:solidFill>
+                <a:schemeClr val="tx1"/>
+              </a:solidFill>
+            </a:endParaRPr>
+          </a:p>
+        </p:txBody>
+      </p:sp>
+      <p:sp>
+        <p:nvSpPr>
+          <p:cNvPr id="23" name="Rounded Rectangle 22"/>
           <p:cNvSpPr/>
           <p:nvPr/>
         </p:nvSpPr>
         <p:spPr>
-          <a:xfrm rot="5400000">
-            <a:off x="5173128" y="680792"/>
-            <a:ext cx="731520" cy="5824459"/>
-          </a:xfrm>
-          <a:prstGeom prst="curvedLeftArrow">
+          <a:xfrm>
+            <a:off x="9441889" y="1176028"/>
+            <a:ext cx="1821628" cy="742944"/>
+          </a:xfrm>
+          <a:prstGeom prst="roundRect">
             <a:avLst/>
           </a:prstGeom>
         </p:spPr>
@@ -3514,11 +3524,11 @@
           <a:lstStyle/>
           <a:p>
             <a:pPr algn="ctr"/>
-            <a:endParaRPr lang="en-US">
-              <a:solidFill>
-                <a:schemeClr val="tx1"/>
-              </a:solidFill>
-            </a:endParaRPr>
+            <a:r>
+              <a:rPr lang="en-US" dirty="0" smtClean="0"/>
+              <a:t>Score Observation</a:t>
+            </a:r>
+            <a:endParaRPr lang="en-US" dirty="0"/>
           </a:p>
         </p:txBody>
       </p:sp>
@@ -3530,7 +3540,7 @@
         </p:nvSpPr>
         <p:spPr>
           <a:xfrm>
-            <a:off x="4870626" y="4183589"/>
+            <a:off x="3928292" y="4214412"/>
             <a:ext cx="2000922" cy="923330"/>
           </a:xfrm>
           <a:prstGeom prst="rect">
@@ -3544,9 +3554,18 @@
           </a:bodyPr>
           <a:lstStyle/>
           <a:p>
+            <a:pPr algn="ctr"/>
             <a:r>
               <a:rPr lang="en-US" dirty="0" smtClean="0"/>
-              <a:t>Based on the answer Get a new Question</a:t>
+              <a:t>Based on </a:t>
+            </a:r>
+            <a:r>
+              <a:rPr lang="en-US" dirty="0" smtClean="0"/>
+              <a:t>the last </a:t>
+            </a:r>
+            <a:r>
+              <a:rPr lang="en-US" dirty="0" smtClean="0"/>
+              <a:t>answer Get a new Question</a:t>
             </a:r>
             <a:endParaRPr lang="en-US" dirty="0"/>
           </a:p>
@@ -3554,32 +3573,140 @@
       </p:sp>
       <p:sp>
         <p:nvSpPr>
-          <p:cNvPr id="22" name="Rectangle 21"/>
-          <p:cNvSpPr/>
+          <p:cNvPr id="30" name="TextBox 29"/>
+          <p:cNvSpPr txBox="1"/>
           <p:nvPr/>
         </p:nvSpPr>
         <p:spPr>
           <a:xfrm>
-            <a:off x="9801811" y="991082"/>
-            <a:ext cx="1901702" cy="1754326"/>
+            <a:off x="6382769" y="5363397"/>
+            <a:ext cx="2323651" cy="923330"/>
           </a:xfrm>
           <a:prstGeom prst="rect">
             <a:avLst/>
           </a:prstGeom>
-        </p:spPr>
-        <p:txBody>
-          <a:bodyPr wrap="square">
+          <a:noFill/>
+        </p:spPr>
+        <p:txBody>
+          <a:bodyPr wrap="square" rtlCol="0">
             <a:spAutoFit/>
           </a:bodyPr>
           <a:lstStyle/>
           <a:p>
+            <a:pPr algn="ctr"/>
+            <a:r>
+              <a:rPr lang="en-US" b="1" dirty="0" smtClean="0"/>
+              <a:t>Form Filler (Web App/ Patient Portal)</a:t>
+            </a:r>
+          </a:p>
+          <a:p>
+            <a:endParaRPr lang="en-US" b="1" dirty="0"/>
+          </a:p>
+        </p:txBody>
+      </p:sp>
+      <p:sp>
+        <p:nvSpPr>
+          <p:cNvPr id="31" name="TextBox 30"/>
+          <p:cNvSpPr txBox="1"/>
+          <p:nvPr/>
+        </p:nvSpPr>
+        <p:spPr>
+          <a:xfrm>
+            <a:off x="1009720" y="5342619"/>
+            <a:ext cx="2920702" cy="923330"/>
+          </a:xfrm>
+          <a:prstGeom prst="rect">
+            <a:avLst/>
+          </a:prstGeom>
+          <a:noFill/>
+        </p:spPr>
+        <p:txBody>
+          <a:bodyPr wrap="square" rtlCol="0">
+            <a:spAutoFit/>
+          </a:bodyPr>
+          <a:lstStyle/>
+          <a:p>
+            <a:pPr algn="ctr"/>
+            <a:r>
+              <a:rPr lang="en-US" b="1" dirty="0" smtClean="0"/>
+              <a:t>Assessment Bank/CDS Engine</a:t>
+            </a:r>
+          </a:p>
+          <a:p>
+            <a:pPr algn="ctr"/>
+            <a:endParaRPr lang="en-US" b="1" dirty="0"/>
+          </a:p>
+        </p:txBody>
+      </p:sp>
+      <p:sp>
+        <p:nvSpPr>
+          <p:cNvPr id="29" name="TextBox 28"/>
+          <p:cNvSpPr txBox="1"/>
+          <p:nvPr/>
+        </p:nvSpPr>
+        <p:spPr>
+          <a:xfrm>
+            <a:off x="6382769" y="1797414"/>
+            <a:ext cx="2546079" cy="1477328"/>
+          </a:xfrm>
+          <a:prstGeom prst="rect">
+            <a:avLst/>
+          </a:prstGeom>
+          <a:noFill/>
+        </p:spPr>
+        <p:txBody>
+          <a:bodyPr wrap="square" rtlCol="0">
+            <a:spAutoFit/>
+          </a:bodyPr>
+          <a:lstStyle/>
+          <a:p>
+            <a:pPr marL="342900" indent="-342900">
+              <a:buFont typeface="+mj-lt"/>
+              <a:buAutoNum type="arabicPeriod"/>
+            </a:pPr>
             <a:r>
               <a:rPr lang="en-US" dirty="0" smtClean="0"/>
-              <a:t> Generate Observation when done  signal by Assessment Bank sending a score, status, </a:t>
-            </a:r>
-            <a:r>
-              <a:rPr lang="en-US" dirty="0" err="1" smtClean="0"/>
-              <a:t>etc</a:t>
+              <a:t>Stores Score</a:t>
+            </a:r>
+          </a:p>
+          <a:p>
+            <a:pPr marL="342900" indent="-342900">
+              <a:buFont typeface="+mj-lt"/>
+              <a:buAutoNum type="arabicPeriod"/>
+            </a:pPr>
+            <a:r>
+              <a:rPr lang="en-US" dirty="0" smtClean="0"/>
+              <a:t>Records  Question</a:t>
+            </a:r>
+          </a:p>
+          <a:p>
+            <a:pPr marL="342900" indent="-342900">
+              <a:buFont typeface="+mj-lt"/>
+              <a:buAutoNum type="arabicPeriod"/>
+            </a:pPr>
+            <a:r>
+              <a:rPr lang="en-US" dirty="0" smtClean="0"/>
+              <a:t>Renders  Question</a:t>
+            </a:r>
+          </a:p>
+          <a:p>
+            <a:pPr marL="342900" indent="-342900">
+              <a:buFont typeface="+mj-lt"/>
+              <a:buAutoNum type="arabicPeriod"/>
+            </a:pPr>
+            <a:r>
+              <a:rPr lang="en-US" dirty="0" smtClean="0"/>
+              <a:t>Records Response</a:t>
+            </a:r>
+          </a:p>
+          <a:p>
+            <a:pPr marL="342900" indent="-342900">
+              <a:buFont typeface="+mj-lt"/>
+              <a:buAutoNum type="arabicPeriod"/>
+            </a:pPr>
+            <a:r>
+              <a:rPr lang="en-US" dirty="0"/>
+              <a:t>Fetch next Question</a:t>
             </a:r>
             <a:endParaRPr lang="en-US" dirty="0"/>
           </a:p>
@@ -3587,14 +3714,14 @@
       </p:sp>
       <p:sp>
         <p:nvSpPr>
-          <p:cNvPr id="23" name="Rounded Rectangle 22"/>
+          <p:cNvPr id="35" name="Rounded Rectangle 34"/>
           <p:cNvSpPr/>
           <p:nvPr/>
         </p:nvSpPr>
         <p:spPr>
           <a:xfrm>
-            <a:off x="9714347" y="3189643"/>
-            <a:ext cx="1821628" cy="742944"/>
+            <a:off x="9568087" y="2361741"/>
+            <a:ext cx="1821628" cy="1733496"/>
           </a:xfrm>
           <a:prstGeom prst="roundRect">
             <a:avLst/>
@@ -3617,13 +3744,13 @@
           </a:fontRef>
         </p:style>
         <p:txBody>
-          <a:bodyPr rtlCol="0" anchor="ctr"/>
+          <a:bodyPr rtlCol="0" anchor="b"/>
           <a:lstStyle/>
           <a:p>
             <a:pPr algn="ctr"/>
             <a:r>
               <a:rPr lang="en-US" dirty="0" smtClean="0"/>
-              <a:t>Score Observation</a:t>
+              <a:t>Questionnaire-Response</a:t>
             </a:r>
             <a:endParaRPr lang="en-US" dirty="0"/>
           </a:p>
@@ -3631,18 +3758,24 @@
       </p:sp>
       <p:sp>
         <p:nvSpPr>
-          <p:cNvPr id="26" name="Right Arrow 25"/>
+          <p:cNvPr id="34" name="Rounded Rectangle 33"/>
           <p:cNvSpPr/>
           <p:nvPr/>
         </p:nvSpPr>
         <p:spPr>
-          <a:xfrm rot="2940025">
-            <a:off x="9395736" y="2871021"/>
-            <a:ext cx="431598" cy="300692"/>
-          </a:xfrm>
-          <a:prstGeom prst="rightArrow">
+          <a:xfrm>
+            <a:off x="9703491" y="2594912"/>
+            <a:ext cx="1610321" cy="582551"/>
+          </a:xfrm>
+          <a:prstGeom prst="roundRect">
             <a:avLst/>
           </a:prstGeom>
+          <a:solidFill>
+            <a:schemeClr val="accent1">
+              <a:lumMod val="40000"/>
+              <a:lumOff val="60000"/>
+            </a:schemeClr>
+          </a:solidFill>
         </p:spPr>
         <p:style>
           <a:lnRef idx="2">
@@ -3665,194 +3798,124 @@
           <a:lstStyle/>
           <a:p>
             <a:pPr algn="ctr"/>
-            <a:endParaRPr lang="en-US"/>
-          </a:p>
-        </p:txBody>
-      </p:sp>
-      <p:sp>
-        <p:nvSpPr>
-          <p:cNvPr id="30" name="TextBox 29"/>
-          <p:cNvSpPr txBox="1"/>
+            <a:r>
+              <a:rPr lang="en-US" smtClean="0"/>
+              <a:t>Contained Questionnaire</a:t>
+            </a:r>
+            <a:endParaRPr lang="en-US" dirty="0"/>
+          </a:p>
+        </p:txBody>
+      </p:sp>
+      <p:cxnSp>
+        <p:nvCxnSpPr>
+          <p:cNvPr id="3" name="Straight Arrow Connector 2"/>
+          <p:cNvCxnSpPr/>
           <p:nvPr/>
-        </p:nvSpPr>
-        <p:spPr>
-          <a:xfrm>
-            <a:off x="8398434" y="4588746"/>
-            <a:ext cx="2323651" cy="2215991"/>
-          </a:xfrm>
-          <a:prstGeom prst="rect">
+        </p:nvCxnSpPr>
+        <p:spPr>
+          <a:xfrm flipV="1">
+            <a:off x="8122024" y="1558283"/>
+            <a:ext cx="1319865" cy="401989"/>
+          </a:xfrm>
+          <a:prstGeom prst="straightConnector1">
             <a:avLst/>
           </a:prstGeom>
-          <a:noFill/>
-        </p:spPr>
-        <p:txBody>
-          <a:bodyPr wrap="square" rtlCol="0">
-            <a:spAutoFit/>
-          </a:bodyPr>
-          <a:lstStyle/>
-          <a:p>
-            <a:r>
-              <a:rPr lang="en-US" b="1" dirty="0" smtClean="0"/>
-              <a:t>Form Filler (Web App/ Patient Portal)</a:t>
-            </a:r>
-          </a:p>
-          <a:p>
-            <a:endParaRPr lang="en-US" b="1" dirty="0"/>
-          </a:p>
-          <a:p>
-            <a:r>
-              <a:rPr lang="en-US" sz="1400" b="1" dirty="0" smtClean="0"/>
-              <a:t>Roles: </a:t>
-            </a:r>
-          </a:p>
-          <a:p>
-            <a:pPr marL="285750" indent="-285750">
-              <a:buFont typeface="Arial" charset="0"/>
-              <a:buChar char="•"/>
-            </a:pPr>
-            <a:r>
-              <a:rPr lang="en-US" sz="1400" b="1" dirty="0" err="1" smtClean="0"/>
-              <a:t>Reg</a:t>
-            </a:r>
-            <a:r>
-              <a:rPr lang="en-US" sz="1400" b="1" dirty="0" smtClean="0"/>
-              <a:t>/login</a:t>
-            </a:r>
-          </a:p>
-          <a:p>
-            <a:pPr marL="285750" indent="-285750">
-              <a:buFont typeface="Arial" charset="0"/>
-              <a:buChar char="•"/>
-            </a:pPr>
-            <a:r>
-              <a:rPr lang="en-US" sz="1400" b="1" dirty="0" smtClean="0"/>
-              <a:t>Fetches questions</a:t>
-            </a:r>
-          </a:p>
-          <a:p>
-            <a:pPr marL="285750" indent="-285750">
-              <a:buFont typeface="Arial" charset="0"/>
-              <a:buChar char="•"/>
-            </a:pPr>
-            <a:r>
-              <a:rPr lang="en-US" sz="1400" b="1" dirty="0"/>
-              <a:t>R</a:t>
-            </a:r>
-            <a:r>
-              <a:rPr lang="en-US" sz="1400" b="1" dirty="0" smtClean="0"/>
-              <a:t>enders questions</a:t>
-            </a:r>
-          </a:p>
-          <a:p>
-            <a:pPr marL="285750" indent="-285750">
-              <a:buFont typeface="Arial" charset="0"/>
-              <a:buChar char="•"/>
-            </a:pPr>
-            <a:r>
-              <a:rPr lang="en-US" sz="1400" b="1" dirty="0" smtClean="0"/>
-              <a:t>Records response </a:t>
-            </a:r>
-          </a:p>
-          <a:p>
-            <a:pPr marL="285750" indent="-285750">
-              <a:buFont typeface="Arial" charset="0"/>
-              <a:buChar char="•"/>
-            </a:pPr>
-            <a:r>
-              <a:rPr lang="en-US" sz="1400" b="1" dirty="0" smtClean="0"/>
-              <a:t>Display/Record score</a:t>
-            </a:r>
-            <a:endParaRPr lang="en-US" b="1" dirty="0"/>
-          </a:p>
-        </p:txBody>
-      </p:sp>
-      <p:sp>
-        <p:nvSpPr>
-          <p:cNvPr id="31" name="TextBox 30"/>
-          <p:cNvSpPr txBox="1"/>
+          <a:ln w="53975">
+            <a:solidFill>
+              <a:srgbClr val="0070C0"/>
+            </a:solidFill>
+            <a:tailEnd type="triangle"/>
+          </a:ln>
+        </p:spPr>
+        <p:style>
+          <a:lnRef idx="1">
+            <a:schemeClr val="accent1"/>
+          </a:lnRef>
+          <a:fillRef idx="0">
+            <a:schemeClr val="accent1"/>
+          </a:fillRef>
+          <a:effectRef idx="0">
+            <a:schemeClr val="accent1"/>
+          </a:effectRef>
+          <a:fontRef idx="minor">
+            <a:schemeClr val="tx1"/>
+          </a:fontRef>
+        </p:style>
+      </p:cxnSp>
+      <p:cxnSp>
+        <p:nvCxnSpPr>
+          <p:cNvPr id="38" name="Straight Arrow Connector 37"/>
+          <p:cNvCxnSpPr/>
           <p:nvPr/>
-        </p:nvSpPr>
-        <p:spPr>
-          <a:xfrm>
-            <a:off x="760753" y="4620329"/>
-            <a:ext cx="3023556" cy="1723549"/>
-          </a:xfrm>
-          <a:prstGeom prst="rect">
+        </p:nvCxnSpPr>
+        <p:spPr>
+          <a:xfrm>
+            <a:off x="8601685" y="2284589"/>
+            <a:ext cx="1123844" cy="615086"/>
+          </a:xfrm>
+          <a:prstGeom prst="straightConnector1">
             <a:avLst/>
           </a:prstGeom>
-          <a:noFill/>
-        </p:spPr>
-        <p:txBody>
-          <a:bodyPr wrap="square" rtlCol="0">
-            <a:spAutoFit/>
-          </a:bodyPr>
-          <a:lstStyle/>
-          <a:p>
-            <a:r>
-              <a:rPr lang="en-US" b="1" dirty="0" smtClean="0"/>
-              <a:t>Assessment Bank/CDS Engine</a:t>
-            </a:r>
-          </a:p>
-          <a:p>
-            <a:endParaRPr lang="en-US" b="1" dirty="0"/>
-          </a:p>
-          <a:p>
-            <a:r>
-              <a:rPr lang="en-US" sz="1400" b="1" dirty="0" smtClean="0"/>
-              <a:t>Roles:  </a:t>
-            </a:r>
-          </a:p>
-          <a:p>
-            <a:pPr marL="285750" indent="-285750">
-              <a:buFont typeface="Arial" charset="0"/>
-              <a:buChar char="•"/>
-            </a:pPr>
-            <a:r>
-              <a:rPr lang="en-US" sz="1400" b="1" dirty="0"/>
-              <a:t>S</a:t>
-            </a:r>
-            <a:r>
-              <a:rPr lang="en-US" sz="1400" b="1" dirty="0" smtClean="0"/>
-              <a:t>tore questions</a:t>
-            </a:r>
-          </a:p>
-          <a:p>
-            <a:pPr marL="285750" indent="-285750">
-              <a:buFont typeface="Arial" charset="0"/>
-              <a:buChar char="•"/>
-            </a:pPr>
-            <a:r>
-              <a:rPr lang="en-US" sz="1400" b="1" dirty="0"/>
-              <a:t>C</a:t>
-            </a:r>
-            <a:r>
-              <a:rPr lang="en-US" sz="1400" b="1" dirty="0" smtClean="0"/>
-              <a:t>alculate scores</a:t>
-            </a:r>
-          </a:p>
-          <a:p>
-            <a:pPr marL="285750" indent="-285750">
-              <a:buFont typeface="Arial" charset="0"/>
-              <a:buChar char="•"/>
-            </a:pPr>
-            <a:r>
-              <a:rPr lang="en-US" sz="1400" b="1" dirty="0" smtClean="0"/>
-              <a:t>Send next question</a:t>
-            </a:r>
-          </a:p>
-          <a:p>
-            <a:pPr marL="285750" indent="-285750">
-              <a:buFont typeface="Arial" charset="0"/>
-              <a:buChar char="•"/>
-            </a:pPr>
-            <a:r>
-              <a:rPr lang="en-US" sz="1400" b="1" dirty="0" smtClean="0"/>
-              <a:t>Determines when done</a:t>
-            </a:r>
-            <a:endParaRPr lang="en-US" sz="1400" b="1" dirty="0"/>
-          </a:p>
-        </p:txBody>
-      </p:sp>
+          <a:ln w="53975">
+            <a:solidFill>
+              <a:srgbClr val="0070C0"/>
+            </a:solidFill>
+            <a:tailEnd type="triangle"/>
+          </a:ln>
+        </p:spPr>
+        <p:style>
+          <a:lnRef idx="1">
+            <a:schemeClr val="accent1"/>
+          </a:lnRef>
+          <a:fillRef idx="0">
+            <a:schemeClr val="accent1"/>
+          </a:fillRef>
+          <a:effectRef idx="0">
+            <a:schemeClr val="accent1"/>
+          </a:effectRef>
+          <a:fontRef idx="minor">
+            <a:schemeClr val="tx1"/>
+          </a:fontRef>
+        </p:style>
+      </p:cxnSp>
+      <p:cxnSp>
+        <p:nvCxnSpPr>
+          <p:cNvPr id="39" name="Straight Arrow Connector 38"/>
+          <p:cNvCxnSpPr>
+            <a:endCxn id="35" idx="1"/>
+          </p:cNvCxnSpPr>
+          <p:nvPr/>
+        </p:nvCxnSpPr>
+        <p:spPr>
+          <a:xfrm>
+            <a:off x="8527599" y="2856950"/>
+            <a:ext cx="1040488" cy="371539"/>
+          </a:xfrm>
+          <a:prstGeom prst="straightConnector1">
+            <a:avLst/>
+          </a:prstGeom>
+          <a:ln w="53975">
+            <a:solidFill>
+              <a:srgbClr val="0070C0"/>
+            </a:solidFill>
+            <a:tailEnd type="triangle"/>
+          </a:ln>
+        </p:spPr>
+        <p:style>
+          <a:lnRef idx="1">
+            <a:schemeClr val="accent1"/>
+          </a:lnRef>
+          <a:fillRef idx="0">
+            <a:schemeClr val="accent1"/>
+          </a:fillRef>
+          <a:effectRef idx="0">
+            <a:schemeClr val="accent1"/>
+          </a:effectRef>
+          <a:fontRef idx="minor">
+            <a:schemeClr val="tx1"/>
+          </a:fontRef>
+        </p:style>
+      </p:cxnSp>
     </p:spTree>
     <p:extLst>
       <p:ext uri="{BB962C8B-B14F-4D97-AF65-F5344CB8AC3E}">

</xml_diff>